<commit_message>
update ppt and README
</commit_message>
<xml_diff>
--- a/Final_project/FPGA_Group5_AES.pptx
+++ b/Final_project/FPGA_Group5_AES.pptx
@@ -857,7 +857,7 @@
           <a:p>
             <a:fld id="{09AF25D5-E709-4EC6-B6E6-D0C0C76D03A7}" type="datetimeFigureOut">
               <a:rPr lang="zh-TW" altLang="en-US" smtClean="0"/>
-              <a:t>2019/12/28</a:t>
+              <a:t>2020/1/5</a:t>
             </a:fld>
             <a:endParaRPr lang="zh-TW" altLang="en-US"/>
           </a:p>
@@ -1108,7 +1108,7 @@
           <a:p>
             <a:fld id="{09AF25D5-E709-4EC6-B6E6-D0C0C76D03A7}" type="datetimeFigureOut">
               <a:rPr lang="zh-TW" altLang="en-US" smtClean="0"/>
-              <a:t>2019/12/28</a:t>
+              <a:t>2020/1/5</a:t>
             </a:fld>
             <a:endParaRPr lang="zh-TW" altLang="en-US"/>
           </a:p>
@@ -1422,7 +1422,7 @@
           <a:p>
             <a:fld id="{09AF25D5-E709-4EC6-B6E6-D0C0C76D03A7}" type="datetimeFigureOut">
               <a:rPr lang="zh-TW" altLang="en-US" smtClean="0"/>
-              <a:t>2019/12/28</a:t>
+              <a:t>2020/1/5</a:t>
             </a:fld>
             <a:endParaRPr lang="zh-TW" altLang="en-US"/>
           </a:p>
@@ -1763,7 +1763,7 @@
           <a:p>
             <a:fld id="{09AF25D5-E709-4EC6-B6E6-D0C0C76D03A7}" type="datetimeFigureOut">
               <a:rPr lang="zh-TW" altLang="en-US" smtClean="0"/>
-              <a:t>2019/12/28</a:t>
+              <a:t>2020/1/5</a:t>
             </a:fld>
             <a:endParaRPr lang="zh-TW" altLang="en-US"/>
           </a:p>
@@ -2077,7 +2077,7 @@
           <a:p>
             <a:fld id="{09AF25D5-E709-4EC6-B6E6-D0C0C76D03A7}" type="datetimeFigureOut">
               <a:rPr lang="zh-TW" altLang="en-US" smtClean="0"/>
-              <a:t>2019/12/28</a:t>
+              <a:t>2020/1/5</a:t>
             </a:fld>
             <a:endParaRPr lang="zh-TW" altLang="en-US"/>
           </a:p>
@@ -2470,7 +2470,7 @@
           <a:p>
             <a:fld id="{09AF25D5-E709-4EC6-B6E6-D0C0C76D03A7}" type="datetimeFigureOut">
               <a:rPr lang="zh-TW" altLang="en-US" smtClean="0"/>
-              <a:t>2019/12/28</a:t>
+              <a:t>2020/1/5</a:t>
             </a:fld>
             <a:endParaRPr lang="zh-TW" altLang="en-US"/>
           </a:p>
@@ -2640,7 +2640,7 @@
           <a:p>
             <a:fld id="{09AF25D5-E709-4EC6-B6E6-D0C0C76D03A7}" type="datetimeFigureOut">
               <a:rPr lang="zh-TW" altLang="en-US" smtClean="0"/>
-              <a:t>2019/12/28</a:t>
+              <a:t>2020/1/5</a:t>
             </a:fld>
             <a:endParaRPr lang="zh-TW" altLang="en-US"/>
           </a:p>
@@ -2820,7 +2820,7 @@
           <a:p>
             <a:fld id="{09AF25D5-E709-4EC6-B6E6-D0C0C76D03A7}" type="datetimeFigureOut">
               <a:rPr lang="zh-TW" altLang="en-US" smtClean="0"/>
-              <a:t>2019/12/28</a:t>
+              <a:t>2020/1/5</a:t>
             </a:fld>
             <a:endParaRPr lang="zh-TW" altLang="en-US"/>
           </a:p>
@@ -2996,7 +2996,7 @@
           <a:p>
             <a:fld id="{09AF25D5-E709-4EC6-B6E6-D0C0C76D03A7}" type="datetimeFigureOut">
               <a:rPr lang="zh-TW" altLang="en-US" smtClean="0"/>
-              <a:t>2019/12/28</a:t>
+              <a:t>2020/1/5</a:t>
             </a:fld>
             <a:endParaRPr lang="zh-TW" altLang="en-US"/>
           </a:p>
@@ -3243,7 +3243,7 @@
           <a:p>
             <a:fld id="{09AF25D5-E709-4EC6-B6E6-D0C0C76D03A7}" type="datetimeFigureOut">
               <a:rPr lang="zh-TW" altLang="en-US" smtClean="0"/>
-              <a:t>2019/12/28</a:t>
+              <a:t>2020/1/5</a:t>
             </a:fld>
             <a:endParaRPr lang="zh-TW" altLang="en-US"/>
           </a:p>
@@ -3475,7 +3475,7 @@
           <a:p>
             <a:fld id="{09AF25D5-E709-4EC6-B6E6-D0C0C76D03A7}" type="datetimeFigureOut">
               <a:rPr lang="zh-TW" altLang="en-US" smtClean="0"/>
-              <a:t>2019/12/28</a:t>
+              <a:t>2020/1/5</a:t>
             </a:fld>
             <a:endParaRPr lang="zh-TW" altLang="en-US"/>
           </a:p>
@@ -3849,7 +3849,7 @@
           <a:p>
             <a:fld id="{09AF25D5-E709-4EC6-B6E6-D0C0C76D03A7}" type="datetimeFigureOut">
               <a:rPr lang="zh-TW" altLang="en-US" smtClean="0"/>
-              <a:t>2019/12/28</a:t>
+              <a:t>2020/1/5</a:t>
             </a:fld>
             <a:endParaRPr lang="zh-TW" altLang="en-US"/>
           </a:p>
@@ -3972,7 +3972,7 @@
           <a:p>
             <a:fld id="{09AF25D5-E709-4EC6-B6E6-D0C0C76D03A7}" type="datetimeFigureOut">
               <a:rPr lang="zh-TW" altLang="en-US" smtClean="0"/>
-              <a:t>2019/12/28</a:t>
+              <a:t>2020/1/5</a:t>
             </a:fld>
             <a:endParaRPr lang="zh-TW" altLang="en-US"/>
           </a:p>
@@ -4067,7 +4067,7 @@
           <a:p>
             <a:fld id="{09AF25D5-E709-4EC6-B6E6-D0C0C76D03A7}" type="datetimeFigureOut">
               <a:rPr lang="zh-TW" altLang="en-US" smtClean="0"/>
-              <a:t>2019/12/28</a:t>
+              <a:t>2020/1/5</a:t>
             </a:fld>
             <a:endParaRPr lang="zh-TW" altLang="en-US"/>
           </a:p>
@@ -4322,7 +4322,7 @@
           <a:p>
             <a:fld id="{09AF25D5-E709-4EC6-B6E6-D0C0C76D03A7}" type="datetimeFigureOut">
               <a:rPr lang="zh-TW" altLang="en-US" smtClean="0"/>
-              <a:t>2019/12/28</a:t>
+              <a:t>2020/1/5</a:t>
             </a:fld>
             <a:endParaRPr lang="zh-TW" altLang="en-US"/>
           </a:p>
@@ -4585,7 +4585,7 @@
           <a:p>
             <a:fld id="{09AF25D5-E709-4EC6-B6E6-D0C0C76D03A7}" type="datetimeFigureOut">
               <a:rPr lang="zh-TW" altLang="en-US" smtClean="0"/>
-              <a:t>2019/12/28</a:t>
+              <a:t>2020/1/5</a:t>
             </a:fld>
             <a:endParaRPr lang="zh-TW" altLang="en-US"/>
           </a:p>
@@ -5328,7 +5328,7 @@
           <a:p>
             <a:fld id="{09AF25D5-E709-4EC6-B6E6-D0C0C76D03A7}" type="datetimeFigureOut">
               <a:rPr lang="zh-TW" altLang="en-US" smtClean="0"/>
-              <a:t>2019/12/28</a:t>
+              <a:t>2020/1/5</a:t>
             </a:fld>
             <a:endParaRPr lang="zh-TW" altLang="en-US"/>
           </a:p>
@@ -13582,8 +13582,8 @@
           </a:p>
         </p:txBody>
       </p:sp>
-      <mc:AlternateContent xmlns:mc="http://schemas.openxmlformats.org/markup-compatibility/2006" xmlns:a14="http://schemas.microsoft.com/office/drawing/2010/main">
-        <mc:Choice Requires="a14">
+      <mc:AlternateContent xmlns:mc="http://schemas.openxmlformats.org/markup-compatibility/2006">
+        <mc:Choice xmlns:a14="http://schemas.microsoft.com/office/drawing/2010/main" Requires="a14">
           <p:sp>
             <p:nvSpPr>
               <p:cNvPr id="3" name="內容版面配置區 2"/>
@@ -14090,45 +14090,12 @@
                 </a:r>
               </a:p>
               <a:p>
-                <a:endParaRPr lang="en-US" altLang="zh-TW" sz="2400" dirty="0"/>
+                <a:endParaRPr lang="en-US" altLang="zh-TW" sz="2400" dirty="0" smtClean="0"/>
               </a:p>
               <a:p>
                 <a:pPr marL="0" indent="0" algn="ctr">
                   <a:buNone/>
                 </a:pPr>
-                <a14:m>
-                  <m:oMath xmlns:m="http://schemas.openxmlformats.org/officeDocument/2006/math">
-                    <m:sSup>
-                      <m:sSupPr>
-                        <m:ctrlPr>
-                          <a:rPr lang="en-US" altLang="zh-TW" sz="2400" i="1">
-                            <a:latin typeface="Cambria Math" panose="02040503050406030204" pitchFamily="18" charset="0"/>
-                          </a:rPr>
-                        </m:ctrlPr>
-                      </m:sSupPr>
-                      <m:e>
-                        <m:r>
-                          <a:rPr lang="en-US" altLang="zh-TW" sz="2400" i="1">
-                            <a:latin typeface="Cambria Math" panose="02040503050406030204" pitchFamily="18" charset="0"/>
-                          </a:rPr>
-                          <m:t>𝑢</m:t>
-                        </m:r>
-                      </m:e>
-                      <m:sup>
-                        <m:r>
-                          <a:rPr lang="en-US" altLang="zh-TW" sz="2400" i="1">
-                            <a:latin typeface="Cambria Math" panose="02040503050406030204" pitchFamily="18" charset="0"/>
-                          </a:rPr>
-                          <m:t>8</m:t>
-                        </m:r>
-                      </m:sup>
-                    </m:sSup>
-                  </m:oMath>
-                </a14:m>
-                <a:r>
-                  <a:rPr lang="en-US" altLang="zh-TW" sz="2400" dirty="0" smtClean="0"/>
-                  <a:t>/(</a:t>
-                </a:r>
                 <a14:m>
                   <m:oMath xmlns:m="http://schemas.openxmlformats.org/officeDocument/2006/math">
                     <m:sSup>
@@ -14162,6 +14129,14 @@
                       </a:rPr>
                       <m:t>+</m:t>
                     </m:r>
+                  </m:oMath>
+                </a14:m>
+                <a:r>
+                  <a:rPr lang="en-US" altLang="zh-TW" sz="2400" dirty="0"/>
+                  <a:t> </a:t>
+                </a:r>
+                <a14:m>
+                  <m:oMath xmlns:m="http://schemas.openxmlformats.org/officeDocument/2006/math">
                     <m:sSup>
                       <m:sSupPr>
                         <m:ctrlPr>
@@ -14239,8 +14214,70 @@
                   </m:oMath>
                 </a14:m>
                 <a:r>
+                  <a:rPr lang="zh-TW" altLang="en-US" sz="2400" dirty="0" smtClean="0"/>
+                  <a:t> </a:t>
+                </a:r>
+                <a:r>
                   <a:rPr lang="en-US" altLang="zh-TW" sz="2400" dirty="0" smtClean="0"/>
-                  <a:t>) = </a:t>
+                  <a:t>=</a:t>
+                </a:r>
+                <a:r>
+                  <a:rPr lang="zh-TW" altLang="en-US" sz="2400" dirty="0" smtClean="0"/>
+                  <a:t> </a:t>
+                </a:r>
+                <a:r>
+                  <a:rPr lang="en-US" altLang="zh-TW" sz="2400" dirty="0" smtClean="0"/>
+                  <a:t>0</a:t>
+                </a:r>
+                <a:endParaRPr lang="en-US" altLang="zh-TW" sz="2400" dirty="0"/>
+              </a:p>
+              <a:p>
+                <a:pPr marL="0" indent="0" algn="ctr">
+                  <a:buNone/>
+                </a:pPr>
+                <a14:m>
+                  <m:oMath xmlns:m="http://schemas.openxmlformats.org/officeDocument/2006/math">
+                    <m:r>
+                      <a:rPr lang="en-US" altLang="zh-TW" sz="2400" i="1" smtClean="0">
+                        <a:latin typeface="Cambria Math" panose="02040503050406030204" pitchFamily="18" charset="0"/>
+                        <a:ea typeface="Cambria Math" panose="02040503050406030204" pitchFamily="18" charset="0"/>
+                      </a:rPr>
+                      <m:t>⇒</m:t>
+                    </m:r>
+                    <m:sSup>
+                      <m:sSupPr>
+                        <m:ctrlPr>
+                          <a:rPr lang="en-US" altLang="zh-TW" sz="2400" i="1">
+                            <a:latin typeface="Cambria Math" panose="02040503050406030204" pitchFamily="18" charset="0"/>
+                          </a:rPr>
+                        </m:ctrlPr>
+                      </m:sSupPr>
+                      <m:e>
+                        <m:r>
+                          <a:rPr lang="en-US" altLang="zh-TW" sz="2400" i="1">
+                            <a:latin typeface="Cambria Math" panose="02040503050406030204" pitchFamily="18" charset="0"/>
+                          </a:rPr>
+                          <m:t>𝑢</m:t>
+                        </m:r>
+                      </m:e>
+                      <m:sup>
+                        <m:r>
+                          <a:rPr lang="en-US" altLang="zh-TW" sz="2400" i="1">
+                            <a:latin typeface="Cambria Math" panose="02040503050406030204" pitchFamily="18" charset="0"/>
+                          </a:rPr>
+                          <m:t>8</m:t>
+                        </m:r>
+                      </m:sup>
+                    </m:sSup>
+                  </m:oMath>
+                </a14:m>
+                <a:r>
+                  <a:rPr lang="zh-TW" altLang="en-US" sz="2400" dirty="0" smtClean="0"/>
+                  <a:t> </a:t>
+                </a:r>
+                <a:r>
+                  <a:rPr lang="en-US" altLang="zh-TW" sz="2400" dirty="0" smtClean="0"/>
+                  <a:t>= </a:t>
                 </a:r>
                 <a14:m>
                   <m:oMath xmlns:m="http://schemas.openxmlformats.org/officeDocument/2006/math">
@@ -14325,7 +14362,7 @@
             </p:txBody>
           </p:sp>
         </mc:Choice>
-        <mc:Fallback xmlns="">
+        <mc:Fallback>
           <p:sp>
             <p:nvSpPr>
               <p:cNvPr id="3" name="內容版面配置區 2"/>
@@ -14535,6 +14572,28 @@
               <a:rPr lang="en-US" altLang="zh-TW" sz="2400" dirty="0" smtClean="0"/>
               <a:t>7.86%)</a:t>
             </a:r>
+          </a:p>
+          <a:p>
+            <a:endParaRPr lang="en-US" altLang="zh-TW" sz="2400" dirty="0"/>
+          </a:p>
+          <a:p>
+            <a:r>
+              <a:rPr lang="en-US" altLang="zh-TW" sz="2400" dirty="0" smtClean="0"/>
+              <a:t>FPGA</a:t>
+            </a:r>
+            <a:r>
+              <a:rPr lang="zh-TW" altLang="en-US" sz="2400" dirty="0" smtClean="0"/>
+              <a:t>適合做</a:t>
+            </a:r>
+            <a:r>
+              <a:rPr lang="en-US" altLang="zh-TW" sz="2400" dirty="0" smtClean="0"/>
+              <a:t>AES</a:t>
+            </a:r>
+            <a:r>
+              <a:rPr lang="zh-TW" altLang="en-US" sz="2400" smtClean="0"/>
+              <a:t>電路</a:t>
+            </a:r>
+            <a:endParaRPr lang="en-US" altLang="zh-TW" sz="2400" dirty="0" smtClean="0"/>
           </a:p>
           <a:p>
             <a:endParaRPr lang="en-US" altLang="zh-TW" sz="2400" dirty="0" smtClean="0"/>

</xml_diff>